<commit_message>
Version 7.1.4 (22.07.2022) - UPDATED: Manual - UPDATED: Round reports further improved - ADDED: Motivational sounds english versions - ADDED: Tree scheme for Clan vs. Clan invasion - PREPARED: Round phases (movement and combat)
</commit_message>
<xml_diff>
--- a/doc/manual/CWG_S003_var01_v1-PlanetareInvasion_CLAN_vs_CLAN.pptx
+++ b/doc/manual/CWG_S003_var01_v1-PlanetareInvasion_CLAN_vs_CLAN.pptx
@@ -243,7 +243,7 @@
           <a:p>
             <a:fld id="{FD7029C7-F9F9-43C6-8A9F-B11F033DBFC4}" type="datetimeFigureOut">
               <a:rPr lang="de-DE" smtClean="0"/>
-              <a:t>23.03.2022</a:t>
+              <a:t>25.07.2022</a:t>
             </a:fld>
             <a:endParaRPr lang="de-DE"/>
           </a:p>
@@ -413,7 +413,7 @@
           <a:p>
             <a:fld id="{FD7029C7-F9F9-43C6-8A9F-B11F033DBFC4}" type="datetimeFigureOut">
               <a:rPr lang="de-DE" smtClean="0"/>
-              <a:t>23.03.2022</a:t>
+              <a:t>25.07.2022</a:t>
             </a:fld>
             <a:endParaRPr lang="de-DE"/>
           </a:p>
@@ -593,7 +593,7 @@
           <a:p>
             <a:fld id="{FD7029C7-F9F9-43C6-8A9F-B11F033DBFC4}" type="datetimeFigureOut">
               <a:rPr lang="de-DE" smtClean="0"/>
-              <a:t>23.03.2022</a:t>
+              <a:t>25.07.2022</a:t>
             </a:fld>
             <a:endParaRPr lang="de-DE"/>
           </a:p>
@@ -763,7 +763,7 @@
           <a:p>
             <a:fld id="{FD7029C7-F9F9-43C6-8A9F-B11F033DBFC4}" type="datetimeFigureOut">
               <a:rPr lang="de-DE" smtClean="0"/>
-              <a:t>23.03.2022</a:t>
+              <a:t>25.07.2022</a:t>
             </a:fld>
             <a:endParaRPr lang="de-DE"/>
           </a:p>
@@ -1009,7 +1009,7 @@
           <a:p>
             <a:fld id="{FD7029C7-F9F9-43C6-8A9F-B11F033DBFC4}" type="datetimeFigureOut">
               <a:rPr lang="de-DE" smtClean="0"/>
-              <a:t>23.03.2022</a:t>
+              <a:t>25.07.2022</a:t>
             </a:fld>
             <a:endParaRPr lang="de-DE"/>
           </a:p>
@@ -1241,7 +1241,7 @@
           <a:p>
             <a:fld id="{FD7029C7-F9F9-43C6-8A9F-B11F033DBFC4}" type="datetimeFigureOut">
               <a:rPr lang="de-DE" smtClean="0"/>
-              <a:t>23.03.2022</a:t>
+              <a:t>25.07.2022</a:t>
             </a:fld>
             <a:endParaRPr lang="de-DE"/>
           </a:p>
@@ -1608,7 +1608,7 @@
           <a:p>
             <a:fld id="{FD7029C7-F9F9-43C6-8A9F-B11F033DBFC4}" type="datetimeFigureOut">
               <a:rPr lang="de-DE" smtClean="0"/>
-              <a:t>23.03.2022</a:t>
+              <a:t>25.07.2022</a:t>
             </a:fld>
             <a:endParaRPr lang="de-DE"/>
           </a:p>
@@ -1726,7 +1726,7 @@
           <a:p>
             <a:fld id="{FD7029C7-F9F9-43C6-8A9F-B11F033DBFC4}" type="datetimeFigureOut">
               <a:rPr lang="de-DE" smtClean="0"/>
-              <a:t>23.03.2022</a:t>
+              <a:t>25.07.2022</a:t>
             </a:fld>
             <a:endParaRPr lang="de-DE"/>
           </a:p>
@@ -1821,7 +1821,7 @@
           <a:p>
             <a:fld id="{FD7029C7-F9F9-43C6-8A9F-B11F033DBFC4}" type="datetimeFigureOut">
               <a:rPr lang="de-DE" smtClean="0"/>
-              <a:t>23.03.2022</a:t>
+              <a:t>25.07.2022</a:t>
             </a:fld>
             <a:endParaRPr lang="de-DE"/>
           </a:p>
@@ -2098,7 +2098,7 @@
           <a:p>
             <a:fld id="{FD7029C7-F9F9-43C6-8A9F-B11F033DBFC4}" type="datetimeFigureOut">
               <a:rPr lang="de-DE" smtClean="0"/>
-              <a:t>23.03.2022</a:t>
+              <a:t>25.07.2022</a:t>
             </a:fld>
             <a:endParaRPr lang="de-DE"/>
           </a:p>
@@ -2355,7 +2355,7 @@
           <a:p>
             <a:fld id="{FD7029C7-F9F9-43C6-8A9F-B11F033DBFC4}" type="datetimeFigureOut">
               <a:rPr lang="de-DE" smtClean="0"/>
-              <a:t>23.03.2022</a:t>
+              <a:t>25.07.2022</a:t>
             </a:fld>
             <a:endParaRPr lang="de-DE"/>
           </a:p>
@@ -2568,7 +2568,7 @@
           <a:p>
             <a:fld id="{FD7029C7-F9F9-43C6-8A9F-B11F033DBFC4}" type="datetimeFigureOut">
               <a:rPr lang="de-DE" smtClean="0"/>
-              <a:t>23.03.2022</a:t>
+              <a:t>25.07.2022</a:t>
             </a:fld>
             <a:endParaRPr lang="de-DE"/>
           </a:p>
@@ -3018,15 +3018,20 @@
           <p:nvPr/>
         </p:nvPicPr>
         <p:blipFill>
-          <a:blip r:embed="rId3"/>
-          <a:stretch>
-            <a:fillRect/>
-          </a:stretch>
+          <a:blip r:embed="rId3">
+            <a:extLst>
+              <a:ext uri="{28A0092B-C50C-407E-A947-70E740481C1C}">
+                <a14:useLocalDpi xmlns:a14="http://schemas.microsoft.com/office/drawing/2010/main" val="0"/>
+              </a:ext>
+            </a:extLst>
+          </a:blip>
+          <a:srcRect/>
+          <a:stretch/>
         </p:blipFill>
         <p:spPr>
           <a:xfrm>
-            <a:off x="20109601" y="939595"/>
-            <a:ext cx="808398" cy="902562"/>
+            <a:off x="20140938" y="939595"/>
+            <a:ext cx="745723" cy="902562"/>
           </a:xfrm>
           <a:prstGeom prst="rect">
             <a:avLst/>
@@ -3048,15 +3053,20 @@
           <p:nvPr/>
         </p:nvPicPr>
         <p:blipFill>
-          <a:blip r:embed="rId3"/>
-          <a:stretch>
-            <a:fillRect/>
-          </a:stretch>
+          <a:blip r:embed="rId3">
+            <a:extLst>
+              <a:ext uri="{28A0092B-C50C-407E-A947-70E740481C1C}">
+                <a14:useLocalDpi xmlns:a14="http://schemas.microsoft.com/office/drawing/2010/main" val="0"/>
+              </a:ext>
+            </a:extLst>
+          </a:blip>
+          <a:srcRect/>
+          <a:stretch/>
         </p:blipFill>
         <p:spPr>
           <a:xfrm>
-            <a:off x="15563941" y="2601843"/>
-            <a:ext cx="2754983" cy="3075888"/>
+            <a:off x="15727553" y="2935718"/>
+            <a:ext cx="2275435" cy="2754000"/>
           </a:xfrm>
           <a:prstGeom prst="rect">
             <a:avLst/>
@@ -3441,7 +3451,7 @@
                 </a:solidFill>
                 <a:latin typeface="Helvetica" panose="020B0604020202020204" pitchFamily="34" charset="0"/>
               </a:rPr>
-              <a:t>Szenario 002 / Variante 01 (Version 5)</a:t>
+              <a:t>Szenario 003 / Variante 01 (Version 1)</a:t>
             </a:r>
             <a:br>
               <a:rPr lang="it-IT" sz="1600" dirty="0"/>
@@ -3464,40 +3474,13 @@
               </a:rPr>
             </a:br>
             <a:r>
-              <a:rPr lang="it-IT" sz="1600" b="1" dirty="0" err="1">
-                <a:solidFill>
-                  <a:srgbClr val="000000"/>
-                </a:solidFill>
-                <a:latin typeface="Helvetica" panose="020B0604020202020204" pitchFamily="34" charset="0"/>
-              </a:rPr>
-              <a:t>Innere</a:t>
-            </a:r>
-            <a:r>
               <a:rPr lang="it-IT" sz="1600" b="1" dirty="0">
                 <a:solidFill>
                   <a:srgbClr val="000000"/>
                 </a:solidFill>
                 <a:latin typeface="Helvetica" panose="020B0604020202020204" pitchFamily="34" charset="0"/>
               </a:rPr>
-              <a:t> </a:t>
-            </a:r>
-            <a:r>
-              <a:rPr lang="it-IT" sz="1600" b="1" dirty="0" err="1">
-                <a:solidFill>
-                  <a:srgbClr val="000000"/>
-                </a:solidFill>
-                <a:latin typeface="Helvetica" panose="020B0604020202020204" pitchFamily="34" charset="0"/>
-              </a:rPr>
-              <a:t>Sphäre</a:t>
-            </a:r>
-            <a:r>
-              <a:rPr lang="it-IT" sz="1600" b="1" dirty="0">
-                <a:solidFill>
-                  <a:srgbClr val="000000"/>
-                </a:solidFill>
-                <a:latin typeface="Helvetica" panose="020B0604020202020204" pitchFamily="34" charset="0"/>
-              </a:rPr>
-              <a:t> (ANGREIFER) </a:t>
+              <a:t>Clan (ANGREIFER) </a:t>
             </a:r>
             <a:r>
               <a:rPr lang="it-IT" sz="1600" b="1" dirty="0" err="1">
@@ -3595,7 +3578,7 @@
                   </a:solidFill>
                   <a:latin typeface="Helvetica" panose="020B0604020202020204" pitchFamily="34" charset="0"/>
                 </a:rPr>
-                <a:t>Name: Energiequelle</a:t>
+                <a:t>Name: An die Wand</a:t>
               </a:r>
               <a:endParaRPr lang="de-DE" sz="969" dirty="0">
                 <a:solidFill>
@@ -3613,7 +3596,7 @@
                   </a:solidFill>
                   <a:latin typeface="Helvetica" panose="020B0604020202020204" pitchFamily="34" charset="0"/>
                 </a:rPr>
-                <a:t>Karte: GRIM PLEXUS</a:t>
+                <a:t>Karte: TOURMALINE DESERT</a:t>
               </a:r>
             </a:p>
             <a:p>
@@ -3667,7 +3650,7 @@
                   </a:solidFill>
                   <a:latin typeface="Helvetica" panose="020B0604020202020204" pitchFamily="34" charset="0"/>
                 </a:rPr>
-                <a:t>Die Anlage wurde verteidigt. Die angreifenden Mechs weichen aus und versuchen nun, die Anlage von der Energieversorgung abzuschneiden</a:t>
+                <a:t>Die Verteidiger haben einen Vorteil erkämpft und drängen die Angreifer in die Wüste zurück, wo der Kampf fortgesetzt wird.</a:t>
               </a:r>
             </a:p>
           </p:txBody>
@@ -3787,7 +3770,7 @@
                   </a:solidFill>
                   <a:latin typeface="Helvetica" panose="020B0604020202020204" pitchFamily="34" charset="0"/>
                 </a:rPr>
-                <a:t>Name: Lunare </a:t>
+                <a:t>Name: </a:t>
               </a:r>
               <a:r>
                 <a:rPr lang="de-DE" sz="969" b="1" dirty="0" err="1">
@@ -3796,16 +3779,7 @@
                   </a:solidFill>
                   <a:latin typeface="Helvetica" panose="020B0604020202020204" pitchFamily="34" charset="0"/>
                 </a:rPr>
-                <a:t>Kom</a:t>
-              </a:r>
-              <a:r>
-                <a:rPr lang="de-DE" sz="969" b="1" dirty="0">
-                  <a:solidFill>
-                    <a:srgbClr val="000000"/>
-                  </a:solidFill>
-                  <a:latin typeface="Helvetica" panose="020B0604020202020204" pitchFamily="34" charset="0"/>
-                </a:rPr>
-                <a:t>-Anlage</a:t>
+                <a:t>SavCon</a:t>
               </a:r>
               <a:endParaRPr lang="de-DE" sz="969" dirty="0">
                 <a:solidFill>
@@ -3823,23 +3797,8 @@
                   </a:solidFill>
                   <a:latin typeface="Helvetica" panose="020B0604020202020204" pitchFamily="34" charset="0"/>
                 </a:rPr>
-                <a:t>Karte: HPG </a:t>
+                <a:t>Karte: EMERALD VALE</a:t>
               </a:r>
-              <a:r>
-                <a:rPr lang="de-DE" sz="775" dirty="0" err="1">
-                  <a:solidFill>
-                    <a:srgbClr val="000000"/>
-                  </a:solidFill>
-                  <a:latin typeface="Helvetica" panose="020B0604020202020204" pitchFamily="34" charset="0"/>
-                </a:rPr>
-                <a:t>Manifold</a:t>
-              </a:r>
-              <a:endParaRPr lang="de-DE" sz="775" dirty="0">
-                <a:solidFill>
-                  <a:srgbClr val="000000"/>
-                </a:solidFill>
-                <a:latin typeface="Helvetica" panose="020B0604020202020204" pitchFamily="34" charset="0"/>
-              </a:endParaRPr>
             </a:p>
             <a:p>
               <a:pPr algn="l"/>
@@ -3892,7 +3851,7 @@
                   </a:solidFill>
                   <a:latin typeface="Helvetica" panose="020B0604020202020204" pitchFamily="34" charset="0"/>
                 </a:rPr>
-                <a:t>Die Angreifer versuchen zunächst, die lunare Kommunikations-Anlage einzunehmen, um die Kommunikationswege abzusichern. Sie treffen bei der Anlage auf unerwarteten Widerstand.</a:t>
+                <a:t>Angreifende Kräfte dürfen ohne Gegenwehr landen, nachdem im Gebotsverfahren SafCon gewährt wurde. Die Kämpfe beginnen im vereinbarten Kampfgebiet.</a:t>
               </a:r>
             </a:p>
           </p:txBody>
@@ -4012,7 +3971,7 @@
                   </a:solidFill>
                   <a:latin typeface="Helvetica" panose="020B0604020202020204" pitchFamily="34" charset="0"/>
                 </a:rPr>
-                <a:t>Name: Niederhalten</a:t>
+                <a:t>Name: Sturm</a:t>
               </a:r>
               <a:endParaRPr lang="de-DE" sz="969" dirty="0">
                 <a:solidFill>
@@ -4030,7 +3989,7 @@
                   </a:solidFill>
                   <a:latin typeface="Helvetica" panose="020B0604020202020204" pitchFamily="34" charset="0"/>
                 </a:rPr>
-                <a:t>Karte: RUBELLITE OASIS</a:t>
+                <a:t>Karte: VIRIDIAN BOG</a:t>
               </a:r>
               <a:br>
                 <a:rPr lang="de-DE" sz="775" dirty="0">
@@ -4089,25 +4048,7 @@
                   </a:solidFill>
                   <a:latin typeface="Helvetica" panose="020B0604020202020204" pitchFamily="34" charset="0"/>
                 </a:rPr>
-                <a:t>Die </a:t>
-              </a:r>
-              <a:r>
-                <a:rPr lang="de-DE" sz="775" dirty="0" err="1">
-                  <a:solidFill>
-                    <a:srgbClr val="000000"/>
-                  </a:solidFill>
-                  <a:latin typeface="Helvetica" panose="020B0604020202020204" pitchFamily="34" charset="0"/>
-                </a:rPr>
-                <a:t>Kom</a:t>
-              </a:r>
-              <a:r>
-                <a:rPr lang="de-DE" sz="775" dirty="0">
-                  <a:solidFill>
-                    <a:srgbClr val="000000"/>
-                  </a:solidFill>
-                  <a:latin typeface="Helvetica" panose="020B0604020202020204" pitchFamily="34" charset="0"/>
-                </a:rPr>
-                <a:t>-Anlage wurde eingenommen, die Landung finden plangemäß und effizient statt. Kurz danach erfolgt der Angriff auf die Anlage im Oase-Gebiet.</a:t>
+                <a:t>Die gelandeten Angreifer haben direkt beim ersten Zusammentreffen einen Sieg errungen. Aber der Kampf ist noch nicht entschieden und eine weitere Konfrontation folgt.</a:t>
               </a:r>
             </a:p>
           </p:txBody>
@@ -4319,8 +4260,8 @@
         </p:nvSpPr>
         <p:spPr>
           <a:xfrm>
-            <a:off x="24543376" y="1901742"/>
-            <a:ext cx="1040380" cy="267630"/>
+            <a:off x="24492859" y="1901742"/>
+            <a:ext cx="1153009" cy="267630"/>
           </a:xfrm>
           <a:prstGeom prst="rect">
             <a:avLst/>
@@ -4359,7 +4300,7 @@
                   <a:schemeClr val="tx1"/>
                 </a:solidFill>
               </a:rPr>
-              <a:t>IS (A) gewinnt</a:t>
+              <a:t>CLAN (A) gewinnt</a:t>
             </a:r>
           </a:p>
         </p:txBody>
@@ -4437,7 +4378,7 @@
                   </a:solidFill>
                   <a:latin typeface="Helvetica" panose="020B0604020202020204" pitchFamily="34" charset="0"/>
                 </a:rPr>
-                <a:t>Name: Hinterhalt</a:t>
+                <a:t>Name: Bollwerk</a:t>
               </a:r>
               <a:endParaRPr lang="de-DE" sz="969" dirty="0">
                 <a:solidFill>
@@ -4455,7 +4396,7 @@
                   </a:solidFill>
                   <a:latin typeface="Helvetica" panose="020B0604020202020204" pitchFamily="34" charset="0"/>
                 </a:rPr>
-                <a:t>Karte: VIRIDIAN BOG</a:t>
+                <a:t>Karte: CAUSTIC VALLEY</a:t>
               </a:r>
             </a:p>
             <a:p>
@@ -4509,25 +4450,7 @@
                   </a:solidFill>
                   <a:latin typeface="Helvetica" panose="020B0604020202020204" pitchFamily="34" charset="0"/>
                 </a:rPr>
-                <a:t>Die </a:t>
-              </a:r>
-              <a:r>
-                <a:rPr lang="de-DE" sz="775" dirty="0" err="1">
-                  <a:solidFill>
-                    <a:srgbClr val="000000"/>
-                  </a:solidFill>
-                  <a:latin typeface="Helvetica" panose="020B0604020202020204" pitchFamily="34" charset="0"/>
-                </a:rPr>
-                <a:t>Kom</a:t>
-              </a:r>
-              <a:r>
-                <a:rPr lang="de-DE" sz="775" dirty="0">
-                  <a:solidFill>
-                    <a:srgbClr val="000000"/>
-                  </a:solidFill>
-                  <a:latin typeface="Helvetica" panose="020B0604020202020204" pitchFamily="34" charset="0"/>
-                </a:rPr>
-                <a:t>-Anlage konnte nicht eingenommen werden und daher landen die Angreifer auf dem Planeten, um sich neu zu gruppieren. Sie werden erwartet.</a:t>
+                <a:t>Wieder können die Verteidiger die Oberhand gewinnen und drängen die Kräfte der Angreifen noch weiter zurück. Eine Entscheidung ist absehbar.</a:t>
               </a:r>
             </a:p>
           </p:txBody>
@@ -4695,7 +4618,7 @@
                   </a:solidFill>
                   <a:latin typeface="Helvetica" panose="020B0604020202020204" pitchFamily="34" charset="0"/>
                 </a:rPr>
-                <a:t>Name: Sabotiert</a:t>
+                <a:t>Name: Verbissen</a:t>
               </a:r>
               <a:endParaRPr lang="de-DE" sz="969" dirty="0">
                 <a:solidFill>
@@ -4713,7 +4636,7 @@
                   </a:solidFill>
                   <a:latin typeface="Helvetica" panose="020B0604020202020204" pitchFamily="34" charset="0"/>
                 </a:rPr>
-                <a:t>Karte: TOURMALINE DESERT</a:t>
+                <a:t>Karte: HELLEBORE OUTPOST</a:t>
               </a:r>
             </a:p>
             <a:p>
@@ -4767,25 +4690,7 @@
                   </a:solidFill>
                   <a:latin typeface="Helvetica" panose="020B0604020202020204" pitchFamily="34" charset="0"/>
                 </a:rPr>
-                <a:t>Die </a:t>
-              </a:r>
-              <a:r>
-                <a:rPr lang="de-DE" sz="775" dirty="0" err="1">
-                  <a:solidFill>
-                    <a:srgbClr val="000000"/>
-                  </a:solidFill>
-                  <a:latin typeface="Helvetica" panose="020B0604020202020204" pitchFamily="34" charset="0"/>
-                </a:rPr>
-                <a:t>Kom</a:t>
-              </a:r>
-              <a:r>
-                <a:rPr lang="de-DE" sz="775" dirty="0">
-                  <a:solidFill>
-                    <a:srgbClr val="000000"/>
-                  </a:solidFill>
-                  <a:latin typeface="Helvetica" panose="020B0604020202020204" pitchFamily="34" charset="0"/>
-                </a:rPr>
-                <a:t>-Anlage ist unbrauchbar und die Angreifer können wie geplant in der Wüste landen. Sie bereiten den weiteren Angriff vor. Es kommt zum Kampf.</a:t>
+                <a:t>Die Angreifer konnten eine Stellung etablieren und sich festsetzen. Der Kampf ist noch nicht entschieden und ein kleiner Vorteil kann die Entscheidung bringen.</a:t>
               </a:r>
             </a:p>
             <a:p>
@@ -4904,8 +4809,8 @@
         </p:nvSpPr>
         <p:spPr>
           <a:xfrm>
-            <a:off x="5590450" y="3869728"/>
-            <a:ext cx="1076582" cy="267630"/>
+            <a:off x="5557581" y="3869728"/>
+            <a:ext cx="1165879" cy="267630"/>
           </a:xfrm>
           <a:prstGeom prst="rect">
             <a:avLst/>
@@ -4944,7 +4849,7 @@
                   <a:schemeClr val="tx1"/>
                 </a:solidFill>
               </a:rPr>
-              <a:t>IS (A) gewinnt</a:t>
+              <a:t>CLAN (A) gewinnt</a:t>
             </a:r>
           </a:p>
         </p:txBody>
@@ -5001,7 +4906,7 @@
                 </a:solidFill>
                 <a:latin typeface="Helvetica" panose="020B0604020202020204" pitchFamily="34" charset="0"/>
               </a:rPr>
-              <a:t>Clan gewinnt / Der Angriff ist gescheitert</a:t>
+              <a:t>Verteidigender Clan gewinnt / Der Angriff ist gescheitert</a:t>
             </a:r>
             <a:endParaRPr lang="de-DE" sz="969" dirty="0">
               <a:solidFill>
@@ -5044,7 +4949,7 @@
                 </a:solidFill>
                 <a:latin typeface="Helvetica" panose="020B0604020202020204" pitchFamily="34" charset="0"/>
               </a:rPr>
-              <a:t>Die Angreifer wurden zurückgeschlagen. Die verbliebenen Truppen der angreifenden IS-Fraktion ziehen sich in den Weltraum zurück.</a:t>
+              <a:t>Die Angreifer wurden zurückgeschlagen. Die verbliebenen Truppen des angreifenden Clans ziehen sich in den Weltraum zurück.</a:t>
             </a:r>
           </a:p>
         </p:txBody>
@@ -5169,7 +5074,7 @@
                   </a:solidFill>
                   <a:latin typeface="Helvetica" panose="020B0604020202020204" pitchFamily="34" charset="0"/>
                 </a:rPr>
-                <a:t>Name: Greifbarer Sieg</a:t>
+                <a:t>Name: Unaufhaltsam</a:t>
               </a:r>
               <a:endParaRPr lang="de-DE" sz="969" dirty="0">
                 <a:solidFill>
@@ -5187,7 +5092,7 @@
                   </a:solidFill>
                   <a:latin typeface="Helvetica" panose="020B0604020202020204" pitchFamily="34" charset="0"/>
                 </a:rPr>
-                <a:t>Karte: CAUSTIC VALLEY</a:t>
+                <a:t>Karte: GRIM PLEXUS</a:t>
               </a:r>
             </a:p>
             <a:p>
@@ -5241,35 +5146,8 @@
                   </a:solidFill>
                   <a:latin typeface="Helvetica" panose="020B0604020202020204" pitchFamily="34" charset="0"/>
                 </a:rPr>
-                <a:t>Die Stadt wurde eingenommen. Jetzt setzt der Clan auf die Industrieanlage im </a:t>
+                <a:t>Die Angreifer verbuchen Erfolg auf Erfolg. Noch ein Sieg und der Gegner ist vernichtend geschlagen. Es ist nicht mehr weit bis zum greifbaren Sieg!</a:t>
               </a:r>
-              <a:r>
-                <a:rPr lang="de-DE" sz="775" dirty="0" err="1">
-                  <a:solidFill>
-                    <a:srgbClr val="000000"/>
-                  </a:solidFill>
-                  <a:latin typeface="Helvetica" panose="020B0604020202020204" pitchFamily="34" charset="0"/>
-                </a:rPr>
-                <a:t>Caustic</a:t>
-              </a:r>
-              <a:r>
-                <a:rPr lang="de-DE" sz="775" dirty="0">
-                  <a:solidFill>
-                    <a:srgbClr val="000000"/>
-                  </a:solidFill>
-                  <a:latin typeface="Helvetica" panose="020B0604020202020204" pitchFamily="34" charset="0"/>
-                </a:rPr>
-                <a:t>-Tal, um den Sieg perfekt zu machen. Die Verteidiger haben sich hierher zurückgezogen.</a:t>
-              </a:r>
-            </a:p>
-            <a:p>
-              <a:pPr algn="l"/>
-              <a:endParaRPr lang="de-DE" sz="775" dirty="0">
-                <a:solidFill>
-                  <a:srgbClr val="000000"/>
-                </a:solidFill>
-                <a:latin typeface="Helvetica" panose="020B0604020202020204" pitchFamily="34" charset="0"/>
-              </a:endParaRPr>
             </a:p>
           </p:txBody>
         </p:sp>
@@ -5389,7 +5267,7 @@
                   </a:solidFill>
                   <a:latin typeface="Helvetica" panose="020B0604020202020204" pitchFamily="34" charset="0"/>
                 </a:rPr>
-                <a:t>Name: Lichtschimmer</a:t>
+                <a:t>Name: Gegenfeuer</a:t>
               </a:r>
               <a:endParaRPr lang="de-DE" sz="969" dirty="0">
                 <a:solidFill>
@@ -5407,7 +5285,7 @@
                   </a:solidFill>
                   <a:latin typeface="Helvetica" panose="020B0604020202020204" pitchFamily="34" charset="0"/>
                 </a:rPr>
-                <a:t>Karte: MINING COLLECTIVE</a:t>
+                <a:t>Karte: CRIMSON STRAIT</a:t>
               </a:r>
             </a:p>
             <a:p>
@@ -5461,35 +5339,8 @@
                   </a:solidFill>
                   <a:latin typeface="Helvetica" panose="020B0604020202020204" pitchFamily="34" charset="0"/>
                 </a:rPr>
-                <a:t>Die Angreifer konnten in ihrem Ansturm gebremst werden und die </a:t>
+                <a:t>Die Angreifer wurden in ihrem Vorstürmen gebremst und die Verteidiger schöpfen neue Hoffnung, dass sie eine Niederlage noch abwenden können.</a:t>
               </a:r>
-              <a:r>
-                <a:rPr lang="de-DE" sz="775" dirty="0" err="1">
-                  <a:solidFill>
-                    <a:srgbClr val="000000"/>
-                  </a:solidFill>
-                  <a:latin typeface="Helvetica" panose="020B0604020202020204" pitchFamily="34" charset="0"/>
-                </a:rPr>
-                <a:t>Clanner</a:t>
-              </a:r>
-              <a:r>
-                <a:rPr lang="de-DE" sz="775" dirty="0">
-                  <a:solidFill>
-                    <a:srgbClr val="000000"/>
-                  </a:solidFill>
-                  <a:latin typeface="Helvetica" panose="020B0604020202020204" pitchFamily="34" charset="0"/>
-                </a:rPr>
-                <a:t> bereiten die Verteidigung der Rohstoff-Förderanlagen vor, die jetzt angegriffen werden.</a:t>
-              </a:r>
-            </a:p>
-            <a:p>
-              <a:pPr algn="l"/>
-              <a:endParaRPr lang="de-DE" sz="775" dirty="0">
-                <a:solidFill>
-                  <a:srgbClr val="000000"/>
-                </a:solidFill>
-                <a:latin typeface="Helvetica" panose="020B0604020202020204" pitchFamily="34" charset="0"/>
-              </a:endParaRPr>
             </a:p>
           </p:txBody>
         </p:sp>
@@ -5627,7 +5478,7 @@
                   </a:solidFill>
                   <a:latin typeface="Helvetica" panose="020B0604020202020204" pitchFamily="34" charset="0"/>
                 </a:rPr>
-                <a:t>Karte: RUBELLITE OASIS</a:t>
+                <a:t>Karte: FROZEN CITY</a:t>
               </a:r>
             </a:p>
             <a:p>
@@ -5701,7 +5552,7 @@
             <p:nvPr/>
           </p:nvPicPr>
           <p:blipFill>
-            <a:blip r:embed="rId7" cstate="hqprint">
+            <a:blip r:embed="rId12" cstate="hqprint">
               <a:extLst>
                 <a:ext uri="{28A0092B-C50C-407E-A947-70E740481C1C}">
                   <a14:useLocalDpi xmlns:a14="http://schemas.microsoft.com/office/drawing/2010/main" val="0"/>
@@ -5820,7 +5671,7 @@
                   </a:solidFill>
                   <a:latin typeface="Helvetica" panose="020B0604020202020204" pitchFamily="34" charset="0"/>
                 </a:rPr>
-                <a:t>Karte: FROZEN CITY</a:t>
+                <a:t>Karte: TERRA THERMA</a:t>
               </a:r>
             </a:p>
             <a:p>
@@ -5874,7 +5725,7 @@
                   </a:solidFill>
                   <a:latin typeface="Helvetica" panose="020B0604020202020204" pitchFamily="34" charset="0"/>
                 </a:rPr>
-                <a:t>Die Angreifer haben, trotz der Niederlagen wieder an Boden gewonnen. Sie wollen nun eine Entscheidung erzwingen.</a:t>
+                <a:t>Nach einigem Hin und Her im Kampf, bei dem keine Seite eindeutig gewinnen konnte, kommt es jetzt zu einem entscheidenden Kampf.</a:t>
               </a:r>
             </a:p>
           </p:txBody>
@@ -5894,7 +5745,7 @@
             <p:nvPr/>
           </p:nvPicPr>
           <p:blipFill>
-            <a:blip r:embed="rId12" cstate="hqprint">
+            <a:blip r:embed="rId13" cstate="hqprint">
               <a:extLst>
                 <a:ext uri="{28A0092B-C50C-407E-A947-70E740481C1C}">
                   <a14:useLocalDpi xmlns:a14="http://schemas.microsoft.com/office/drawing/2010/main" val="0"/>
@@ -6317,7 +6168,7 @@
                   </a:solidFill>
                   <a:latin typeface="Helvetica" panose="020B0604020202020204" pitchFamily="34" charset="0"/>
                 </a:rPr>
-                <a:t>Name: Grüne Hölle</a:t>
+                <a:t>Name: In letzter Minute</a:t>
               </a:r>
               <a:endParaRPr lang="de-DE" sz="969" dirty="0">
                 <a:solidFill>
@@ -6335,7 +6186,7 @@
                   </a:solidFill>
                   <a:latin typeface="Helvetica" panose="020B0604020202020204" pitchFamily="34" charset="0"/>
                 </a:rPr>
-                <a:t>Karte: VIRIDIAN BOG</a:t>
+                <a:t>Karte: THE MINING COLLECTIVE</a:t>
               </a:r>
             </a:p>
             <a:p>
@@ -6389,7 +6240,7 @@
                   </a:solidFill>
                   <a:latin typeface="Helvetica" panose="020B0604020202020204" pitchFamily="34" charset="0"/>
                 </a:rPr>
-                <a:t>Noch ist die Hoffnung nicht verloren und im Dschungel kommt es wieder zu einem Zusammenstoß der beiden Kampfverbände.</a:t>
+                <a:t>Die Hoffnung war schon fast aufgegeben, die Entscheidung war so gut wie sicher. Aber die Angreifer können doch aufgehalten werden. Jetzt gilt es, weiter zu machen!</a:t>
               </a:r>
             </a:p>
           </p:txBody>
@@ -6409,7 +6260,7 @@
             <p:nvPr/>
           </p:nvPicPr>
           <p:blipFill>
-            <a:blip r:embed="rId8" cstate="hqprint">
+            <a:blip r:embed="rId14" cstate="hqprint">
               <a:extLst>
                 <a:ext uri="{28A0092B-C50C-407E-A947-70E740481C1C}">
                   <a14:useLocalDpi xmlns:a14="http://schemas.microsoft.com/office/drawing/2010/main" val="0"/>
@@ -6528,7 +6379,7 @@
                   </a:solidFill>
                   <a:latin typeface="Helvetica" panose="020B0604020202020204" pitchFamily="34" charset="0"/>
                 </a:rPr>
-                <a:t>Karte: POLAR HIGHLANDS</a:t>
+                <a:t>Karte: CRIMSON STRAIT</a:t>
               </a:r>
             </a:p>
             <a:p>
@@ -6582,11 +6433,17 @@
                   </a:solidFill>
                   <a:latin typeface="Helvetica" panose="020B0604020202020204" pitchFamily="34" charset="0"/>
                 </a:rPr>
-                <a:t>Nach den letzten Erfolgen der Verteidiger ist jetzt der Zeitpunkt für eine Entscheidung gekommen. Es gibt kein Zurück mehr für keine der beiden Seiten.</a:t>
+                <a:t>Die Entscheidung steht auf Messers Schneide. Im letzten Kampf der Invasion treffen beide Seiten aufeinander, um endgültig einen Sieger </a:t>
               </a:r>
-            </a:p>
-            <a:p>
-              <a:pPr algn="l"/>
+              <a:r>
+                <a:rPr lang="de-DE" sz="775">
+                  <a:solidFill>
+                    <a:srgbClr val="000000"/>
+                  </a:solidFill>
+                  <a:latin typeface="Helvetica" panose="020B0604020202020204" pitchFamily="34" charset="0"/>
+                </a:rPr>
+                <a:t>zu bestimmen.</a:t>
+              </a:r>
               <a:endParaRPr lang="de-DE" sz="775" dirty="0">
                 <a:solidFill>
                   <a:srgbClr val="000000"/>
@@ -6611,7 +6468,7 @@
             <p:nvPr/>
           </p:nvPicPr>
           <p:blipFill>
-            <a:blip r:embed="rId13" cstate="hqprint">
+            <a:blip r:embed="rId11" cstate="hqprint">
               <a:extLst>
                 <a:ext uri="{28A0092B-C50C-407E-A947-70E740481C1C}">
                   <a14:useLocalDpi xmlns:a14="http://schemas.microsoft.com/office/drawing/2010/main" val="0"/>
@@ -6860,7 +6717,7 @@
                   </a:solidFill>
                   <a:latin typeface="Helvetica" panose="020B0604020202020204" pitchFamily="34" charset="0"/>
                 </a:rPr>
-                <a:t>Karte: MINING COLLECTIVE</a:t>
+                <a:t>Karte: POLAR HIGHLANDS</a:t>
               </a:r>
             </a:p>
             <a:p>
@@ -6934,7 +6791,7 @@
             <p:nvPr/>
           </p:nvPicPr>
           <p:blipFill>
-            <a:blip r:embed="rId14" cstate="hqprint">
+            <a:blip r:embed="rId15" cstate="hqprint">
               <a:extLst>
                 <a:ext uri="{28A0092B-C50C-407E-A947-70E740481C1C}">
                   <a14:useLocalDpi xmlns:a14="http://schemas.microsoft.com/office/drawing/2010/main" val="0"/>
@@ -7002,410 +6859,6 @@
           <p:spPr>
             <a:xfrm>
               <a:off x="5789780" y="955163"/>
-              <a:ext cx="2123280" cy="1381017"/>
-            </a:xfrm>
-            <a:prstGeom prst="snip1Rect">
-              <a:avLst/>
-            </a:prstGeom>
-            <a:grpFill/>
-          </p:spPr>
-          <p:style>
-            <a:lnRef idx="1">
-              <a:schemeClr val="accent4"/>
-            </a:lnRef>
-            <a:fillRef idx="2">
-              <a:schemeClr val="accent4"/>
-            </a:fillRef>
-            <a:effectRef idx="1">
-              <a:schemeClr val="accent4"/>
-            </a:effectRef>
-            <a:fontRef idx="minor">
-              <a:schemeClr val="dk1"/>
-            </a:fontRef>
-          </p:style>
-          <p:txBody>
-            <a:bodyPr rtlCol="0" anchor="ctr"/>
-            <a:lstStyle/>
-            <a:p>
-              <a:pPr algn="l"/>
-              <a:r>
-                <a:rPr lang="de-DE" sz="969" b="1" dirty="0">
-                  <a:solidFill>
-                    <a:srgbClr val="000000"/>
-                  </a:solidFill>
-                  <a:latin typeface="Helvetica" panose="020B0604020202020204" pitchFamily="34" charset="0"/>
-                </a:rPr>
-                <a:t>Name: Letztes Gefecht</a:t>
-              </a:r>
-              <a:endParaRPr lang="de-DE" sz="969" dirty="0">
-                <a:solidFill>
-                  <a:srgbClr val="000000"/>
-                </a:solidFill>
-                <a:latin typeface="Helvetica" panose="020B0604020202020204" pitchFamily="34" charset="0"/>
-              </a:endParaRPr>
-            </a:p>
-            <a:p>
-              <a:pPr algn="l"/>
-              <a:r>
-                <a:rPr lang="de-DE" sz="775" dirty="0">
-                  <a:solidFill>
-                    <a:srgbClr val="000000"/>
-                  </a:solidFill>
-                  <a:latin typeface="Helvetica" panose="020B0604020202020204" pitchFamily="34" charset="0"/>
-                </a:rPr>
-                <a:t>Karte: MINING COLLECTIVE</a:t>
-              </a:r>
-            </a:p>
-            <a:p>
-              <a:pPr algn="l"/>
-              <a:r>
-                <a:rPr lang="de-DE" sz="775" dirty="0">
-                  <a:solidFill>
-                    <a:srgbClr val="000000"/>
-                  </a:solidFill>
-                  <a:latin typeface="Helvetica" panose="020B0604020202020204" pitchFamily="34" charset="0"/>
-                </a:rPr>
-                <a:t>Modus: SKIRMISH</a:t>
-              </a:r>
-              <a:br>
-                <a:rPr lang="de-DE" sz="775" dirty="0">
-                  <a:solidFill>
-                    <a:srgbClr val="000000"/>
-                  </a:solidFill>
-                  <a:latin typeface="Helvetica" panose="020B0604020202020204" pitchFamily="34" charset="0"/>
-                </a:rPr>
-              </a:br>
-              <a:br>
-                <a:rPr lang="de-DE" sz="775" dirty="0">
-                  <a:solidFill>
-                    <a:srgbClr val="000000"/>
-                  </a:solidFill>
-                  <a:latin typeface="Helvetica" panose="020B0604020202020204" pitchFamily="34" charset="0"/>
-                </a:rPr>
-              </a:br>
-              <a:r>
-                <a:rPr lang="de-DE" sz="775" i="1" dirty="0">
-                  <a:solidFill>
-                    <a:srgbClr val="000000"/>
-                  </a:solidFill>
-                  <a:latin typeface="Helvetica" panose="020B0604020202020204" pitchFamily="34" charset="0"/>
-                </a:rPr>
-                <a:t>Beschreibung:</a:t>
-              </a:r>
-              <a:br>
-                <a:rPr lang="de-DE" sz="775" dirty="0">
-                  <a:solidFill>
-                    <a:srgbClr val="000000"/>
-                  </a:solidFill>
-                  <a:latin typeface="Helvetica" panose="020B0604020202020204" pitchFamily="34" charset="0"/>
-                </a:rPr>
-              </a:br>
-              <a:r>
-                <a:rPr lang="de-DE" sz="775" dirty="0">
-                  <a:solidFill>
-                    <a:srgbClr val="000000"/>
-                  </a:solidFill>
-                  <a:latin typeface="Helvetica" panose="020B0604020202020204" pitchFamily="34" charset="0"/>
-                </a:rPr>
-                <a:t>Der Gegenangriff wurde zerschlagen. Jetzt kommt es zum finalen Gefecht zwischen den beiden Kampf-Truppen.</a:t>
-              </a:r>
-            </a:p>
-            <a:p>
-              <a:pPr algn="l"/>
-              <a:endParaRPr lang="de-DE" sz="775" dirty="0">
-                <a:solidFill>
-                  <a:srgbClr val="000000"/>
-                </a:solidFill>
-                <a:latin typeface="Helvetica" panose="020B0604020202020204" pitchFamily="34" charset="0"/>
-              </a:endParaRPr>
-            </a:p>
-          </p:txBody>
-        </p:sp>
-        <p:pic>
-          <p:nvPicPr>
-            <p:cNvPr id="194" name="Grafik 193">
-              <a:extLst>
-                <a:ext uri="{FF2B5EF4-FFF2-40B4-BE49-F238E27FC236}">
-                  <a16:creationId xmlns:a16="http://schemas.microsoft.com/office/drawing/2014/main" id="{F244358A-ADF5-4FA6-B325-6FA14939DB57}"/>
-                </a:ext>
-              </a:extLst>
-            </p:cNvPr>
-            <p:cNvPicPr>
-              <a:picLocks noChangeAspect="1"/>
-            </p:cNvPicPr>
-            <p:nvPr/>
-          </p:nvPicPr>
-          <p:blipFill>
-            <a:blip r:embed="rId11" cstate="hqprint">
-              <a:extLst>
-                <a:ext uri="{28A0092B-C50C-407E-A947-70E740481C1C}">
-                  <a14:useLocalDpi xmlns:a14="http://schemas.microsoft.com/office/drawing/2010/main" val="0"/>
-                </a:ext>
-              </a:extLst>
-            </a:blip>
-            <a:srcRect/>
-            <a:stretch/>
-          </p:blipFill>
-          <p:spPr>
-            <a:xfrm>
-              <a:off x="8018329" y="954645"/>
-              <a:ext cx="1381017" cy="1381017"/>
-            </a:xfrm>
-            <a:prstGeom prst="rect">
-              <a:avLst/>
-            </a:prstGeom>
-            <a:grpFill/>
-            <a:ln>
-              <a:solidFill>
-                <a:schemeClr val="tx1"/>
-              </a:solidFill>
-            </a:ln>
-          </p:spPr>
-        </p:pic>
-      </p:grpSp>
-      <p:grpSp>
-        <p:nvGrpSpPr>
-          <p:cNvPr id="197" name="Gruppieren 196">
-            <a:extLst>
-              <a:ext uri="{FF2B5EF4-FFF2-40B4-BE49-F238E27FC236}">
-                <a16:creationId xmlns:a16="http://schemas.microsoft.com/office/drawing/2014/main" id="{DFDB7133-4606-41D0-BB47-C56351607E95}"/>
-              </a:ext>
-            </a:extLst>
-          </p:cNvPr>
-          <p:cNvGrpSpPr/>
-          <p:nvPr/>
-        </p:nvGrpSpPr>
-        <p:grpSpPr>
-          <a:xfrm>
-            <a:off x="5070172" y="6738599"/>
-            <a:ext cx="3609566" cy="1381533"/>
-            <a:chOff x="6035110" y="954647"/>
-            <a:chExt cx="3609566" cy="1381533"/>
-          </a:xfrm>
-          <a:solidFill>
-            <a:schemeClr val="accent1">
-              <a:lumMod val="20000"/>
-              <a:lumOff val="80000"/>
-            </a:schemeClr>
-          </a:solidFill>
-        </p:grpSpPr>
-        <p:sp>
-          <p:nvSpPr>
-            <p:cNvPr id="198" name="Rechteck: eine Ecke abgeschnitten 197">
-              <a:extLst>
-                <a:ext uri="{FF2B5EF4-FFF2-40B4-BE49-F238E27FC236}">
-                  <a16:creationId xmlns:a16="http://schemas.microsoft.com/office/drawing/2014/main" id="{00AC39A1-3C42-4E68-8BE0-53C5FCD4A5A7}"/>
-                </a:ext>
-              </a:extLst>
-            </p:cNvPr>
-            <p:cNvSpPr/>
-            <p:nvPr/>
-          </p:nvSpPr>
-          <p:spPr>
-            <a:xfrm>
-              <a:off x="6035110" y="955163"/>
-              <a:ext cx="2123280" cy="1381017"/>
-            </a:xfrm>
-            <a:prstGeom prst="snip1Rect">
-              <a:avLst/>
-            </a:prstGeom>
-            <a:grpFill/>
-          </p:spPr>
-          <p:style>
-            <a:lnRef idx="1">
-              <a:schemeClr val="accent4"/>
-            </a:lnRef>
-            <a:fillRef idx="2">
-              <a:schemeClr val="accent4"/>
-            </a:fillRef>
-            <a:effectRef idx="1">
-              <a:schemeClr val="accent4"/>
-            </a:effectRef>
-            <a:fontRef idx="minor">
-              <a:schemeClr val="dk1"/>
-            </a:fontRef>
-          </p:style>
-          <p:txBody>
-            <a:bodyPr rtlCol="0" anchor="ctr"/>
-            <a:lstStyle/>
-            <a:p>
-              <a:pPr algn="l"/>
-              <a:r>
-                <a:rPr lang="de-DE" sz="969" b="1" dirty="0">
-                  <a:solidFill>
-                    <a:srgbClr val="000000"/>
-                  </a:solidFill>
-                  <a:latin typeface="Helvetica" panose="020B0604020202020204" pitchFamily="34" charset="0"/>
-                </a:rPr>
-                <a:t>Name: Rücken zur Wand</a:t>
-              </a:r>
-              <a:endParaRPr lang="de-DE" sz="969" dirty="0">
-                <a:solidFill>
-                  <a:srgbClr val="000000"/>
-                </a:solidFill>
-                <a:latin typeface="Helvetica" panose="020B0604020202020204" pitchFamily="34" charset="0"/>
-              </a:endParaRPr>
-            </a:p>
-            <a:p>
-              <a:pPr algn="l"/>
-              <a:r>
-                <a:rPr lang="de-DE" sz="775" dirty="0">
-                  <a:solidFill>
-                    <a:srgbClr val="000000"/>
-                  </a:solidFill>
-                  <a:latin typeface="Helvetica" panose="020B0604020202020204" pitchFamily="34" charset="0"/>
-                </a:rPr>
-                <a:t>Karte: TERRA THERMA</a:t>
-              </a:r>
-            </a:p>
-            <a:p>
-              <a:pPr algn="l"/>
-              <a:r>
-                <a:rPr lang="de-DE" sz="775" dirty="0">
-                  <a:solidFill>
-                    <a:srgbClr val="000000"/>
-                  </a:solidFill>
-                  <a:latin typeface="Helvetica" panose="020B0604020202020204" pitchFamily="34" charset="0"/>
-                </a:rPr>
-                <a:t>Modus: SKIRMISH</a:t>
-              </a:r>
-              <a:br>
-                <a:rPr lang="de-DE" sz="775" dirty="0">
-                  <a:solidFill>
-                    <a:srgbClr val="000000"/>
-                  </a:solidFill>
-                  <a:latin typeface="Helvetica" panose="020B0604020202020204" pitchFamily="34" charset="0"/>
-                </a:rPr>
-              </a:br>
-              <a:br>
-                <a:rPr lang="de-DE" sz="775" dirty="0">
-                  <a:solidFill>
-                    <a:srgbClr val="000000"/>
-                  </a:solidFill>
-                  <a:latin typeface="Helvetica" panose="020B0604020202020204" pitchFamily="34" charset="0"/>
-                </a:rPr>
-              </a:br>
-              <a:r>
-                <a:rPr lang="de-DE" sz="775" i="1" dirty="0">
-                  <a:solidFill>
-                    <a:srgbClr val="000000"/>
-                  </a:solidFill>
-                  <a:latin typeface="Helvetica" panose="020B0604020202020204" pitchFamily="34" charset="0"/>
-                </a:rPr>
-                <a:t>Beschreibung:</a:t>
-              </a:r>
-              <a:br>
-                <a:rPr lang="de-DE" sz="775" dirty="0">
-                  <a:solidFill>
-                    <a:srgbClr val="000000"/>
-                  </a:solidFill>
-                  <a:latin typeface="Helvetica" panose="020B0604020202020204" pitchFamily="34" charset="0"/>
-                </a:rPr>
-              </a:br>
-              <a:r>
-                <a:rPr lang="de-DE" sz="775" dirty="0">
-                  <a:solidFill>
-                    <a:srgbClr val="000000"/>
-                  </a:solidFill>
-                  <a:latin typeface="Helvetica" panose="020B0604020202020204" pitchFamily="34" charset="0"/>
-                </a:rPr>
-                <a:t>Die Angreifer wurden in ihren Vorbereitungen gestört und in das Vulkangebiet zurückgedrängt, wo sie sich erneut zum Kampf stellen müssen.</a:t>
-              </a:r>
-            </a:p>
-            <a:p>
-              <a:pPr algn="l"/>
-              <a:endParaRPr lang="de-DE" sz="775" dirty="0">
-                <a:solidFill>
-                  <a:srgbClr val="000000"/>
-                </a:solidFill>
-                <a:latin typeface="Helvetica" panose="020B0604020202020204" pitchFamily="34" charset="0"/>
-              </a:endParaRPr>
-            </a:p>
-          </p:txBody>
-        </p:sp>
-        <p:pic>
-          <p:nvPicPr>
-            <p:cNvPr id="199" name="Grafik 198">
-              <a:extLst>
-                <a:ext uri="{FF2B5EF4-FFF2-40B4-BE49-F238E27FC236}">
-                  <a16:creationId xmlns:a16="http://schemas.microsoft.com/office/drawing/2014/main" id="{BD27327F-AF5C-471D-A870-FEC5E2772D3E}"/>
-                </a:ext>
-              </a:extLst>
-            </p:cNvPr>
-            <p:cNvPicPr>
-              <a:picLocks noChangeAspect="1"/>
-            </p:cNvPicPr>
-            <p:nvPr/>
-          </p:nvPicPr>
-          <p:blipFill>
-            <a:blip r:embed="rId15" cstate="hqprint">
-              <a:extLst>
-                <a:ext uri="{28A0092B-C50C-407E-A947-70E740481C1C}">
-                  <a14:useLocalDpi xmlns:a14="http://schemas.microsoft.com/office/drawing/2010/main" val="0"/>
-                </a:ext>
-              </a:extLst>
-            </a:blip>
-            <a:srcRect/>
-            <a:stretch/>
-          </p:blipFill>
-          <p:spPr>
-            <a:xfrm>
-              <a:off x="8263659" y="954647"/>
-              <a:ext cx="1381017" cy="1381017"/>
-            </a:xfrm>
-            <a:prstGeom prst="rect">
-              <a:avLst/>
-            </a:prstGeom>
-            <a:grpFill/>
-            <a:ln>
-              <a:solidFill>
-                <a:schemeClr val="tx1"/>
-              </a:solidFill>
-            </a:ln>
-          </p:spPr>
-        </p:pic>
-      </p:grpSp>
-      <p:grpSp>
-        <p:nvGrpSpPr>
-          <p:cNvPr id="201" name="Gruppieren 200">
-            <a:extLst>
-              <a:ext uri="{FF2B5EF4-FFF2-40B4-BE49-F238E27FC236}">
-                <a16:creationId xmlns:a16="http://schemas.microsoft.com/office/drawing/2014/main" id="{A929FECB-E019-4AD8-A565-E510F317D8FA}"/>
-              </a:ext>
-            </a:extLst>
-          </p:cNvPr>
-          <p:cNvGrpSpPr/>
-          <p:nvPr/>
-        </p:nvGrpSpPr>
-        <p:grpSpPr>
-          <a:xfrm>
-            <a:off x="9178365" y="8905378"/>
-            <a:ext cx="3609566" cy="1381533"/>
-            <a:chOff x="6035110" y="954647"/>
-            <a:chExt cx="3609566" cy="1381533"/>
-          </a:xfrm>
-          <a:solidFill>
-            <a:schemeClr val="accent1">
-              <a:lumMod val="20000"/>
-              <a:lumOff val="80000"/>
-            </a:schemeClr>
-          </a:solidFill>
-        </p:grpSpPr>
-        <p:sp>
-          <p:nvSpPr>
-            <p:cNvPr id="202" name="Rechteck: eine Ecke abgeschnitten 201">
-              <a:extLst>
-                <a:ext uri="{FF2B5EF4-FFF2-40B4-BE49-F238E27FC236}">
-                  <a16:creationId xmlns:a16="http://schemas.microsoft.com/office/drawing/2014/main" id="{21E4F2B5-EC52-4615-8C11-54D4F4BAEB0C}"/>
-                </a:ext>
-              </a:extLst>
-            </p:cNvPr>
-            <p:cNvSpPr/>
-            <p:nvPr/>
-          </p:nvSpPr>
-          <p:spPr>
-            <a:xfrm>
-              <a:off x="6035110" y="955163"/>
               <a:ext cx="2123280" cy="1381017"/>
             </a:xfrm>
             <a:prstGeom prst="snip1Rect">
@@ -7511,7 +6964,411 @@
                   </a:solidFill>
                   <a:latin typeface="Helvetica" panose="020B0604020202020204" pitchFamily="34" charset="0"/>
                 </a:rPr>
-                <a:t>Die Industrieanlage wurde verteidigt. Beide Seiten hatten Verluste. Es kommt mit den verbleibenden Truppen zum Entscheidungskampf.</a:t>
+                <a:t>Keine Seite konnte einen eindeutigen Sieg erringen. Es gab Gewinne und Verluste auf beiden Seiten. Aber jetzt ist die für eine Entscheidung gekommen.</a:t>
+              </a:r>
+            </a:p>
+            <a:p>
+              <a:pPr algn="l"/>
+              <a:endParaRPr lang="de-DE" sz="775" dirty="0">
+                <a:solidFill>
+                  <a:srgbClr val="000000"/>
+                </a:solidFill>
+                <a:latin typeface="Helvetica" panose="020B0604020202020204" pitchFamily="34" charset="0"/>
+              </a:endParaRPr>
+            </a:p>
+          </p:txBody>
+        </p:sp>
+        <p:pic>
+          <p:nvPicPr>
+            <p:cNvPr id="194" name="Grafik 193">
+              <a:extLst>
+                <a:ext uri="{FF2B5EF4-FFF2-40B4-BE49-F238E27FC236}">
+                  <a16:creationId xmlns:a16="http://schemas.microsoft.com/office/drawing/2014/main" id="{F244358A-ADF5-4FA6-B325-6FA14939DB57}"/>
+                </a:ext>
+              </a:extLst>
+            </p:cNvPr>
+            <p:cNvPicPr>
+              <a:picLocks noChangeAspect="1"/>
+            </p:cNvPicPr>
+            <p:nvPr/>
+          </p:nvPicPr>
+          <p:blipFill>
+            <a:blip r:embed="rId16" cstate="hqprint">
+              <a:extLst>
+                <a:ext uri="{28A0092B-C50C-407E-A947-70E740481C1C}">
+                  <a14:useLocalDpi xmlns:a14="http://schemas.microsoft.com/office/drawing/2010/main" val="0"/>
+                </a:ext>
+              </a:extLst>
+            </a:blip>
+            <a:srcRect/>
+            <a:stretch/>
+          </p:blipFill>
+          <p:spPr>
+            <a:xfrm>
+              <a:off x="8018329" y="954645"/>
+              <a:ext cx="1381017" cy="1381017"/>
+            </a:xfrm>
+            <a:prstGeom prst="rect">
+              <a:avLst/>
+            </a:prstGeom>
+            <a:grpFill/>
+            <a:ln>
+              <a:solidFill>
+                <a:schemeClr val="tx1"/>
+              </a:solidFill>
+            </a:ln>
+          </p:spPr>
+        </p:pic>
+      </p:grpSp>
+      <p:grpSp>
+        <p:nvGrpSpPr>
+          <p:cNvPr id="197" name="Gruppieren 196">
+            <a:extLst>
+              <a:ext uri="{FF2B5EF4-FFF2-40B4-BE49-F238E27FC236}">
+                <a16:creationId xmlns:a16="http://schemas.microsoft.com/office/drawing/2014/main" id="{DFDB7133-4606-41D0-BB47-C56351607E95}"/>
+              </a:ext>
+            </a:extLst>
+          </p:cNvPr>
+          <p:cNvGrpSpPr/>
+          <p:nvPr/>
+        </p:nvGrpSpPr>
+        <p:grpSpPr>
+          <a:xfrm>
+            <a:off x="5070172" y="6738599"/>
+            <a:ext cx="3609566" cy="1381533"/>
+            <a:chOff x="6035110" y="954647"/>
+            <a:chExt cx="3609566" cy="1381533"/>
+          </a:xfrm>
+          <a:solidFill>
+            <a:schemeClr val="accent1">
+              <a:lumMod val="20000"/>
+              <a:lumOff val="80000"/>
+            </a:schemeClr>
+          </a:solidFill>
+        </p:grpSpPr>
+        <p:sp>
+          <p:nvSpPr>
+            <p:cNvPr id="198" name="Rechteck: eine Ecke abgeschnitten 197">
+              <a:extLst>
+                <a:ext uri="{FF2B5EF4-FFF2-40B4-BE49-F238E27FC236}">
+                  <a16:creationId xmlns:a16="http://schemas.microsoft.com/office/drawing/2014/main" id="{00AC39A1-3C42-4E68-8BE0-53C5FCD4A5A7}"/>
+                </a:ext>
+              </a:extLst>
+            </p:cNvPr>
+            <p:cNvSpPr/>
+            <p:nvPr/>
+          </p:nvSpPr>
+          <p:spPr>
+            <a:xfrm>
+              <a:off x="6035110" y="955163"/>
+              <a:ext cx="2123280" cy="1381017"/>
+            </a:xfrm>
+            <a:prstGeom prst="snip1Rect">
+              <a:avLst/>
+            </a:prstGeom>
+            <a:grpFill/>
+          </p:spPr>
+          <p:style>
+            <a:lnRef idx="1">
+              <a:schemeClr val="accent4"/>
+            </a:lnRef>
+            <a:fillRef idx="2">
+              <a:schemeClr val="accent4"/>
+            </a:fillRef>
+            <a:effectRef idx="1">
+              <a:schemeClr val="accent4"/>
+            </a:effectRef>
+            <a:fontRef idx="minor">
+              <a:schemeClr val="dk1"/>
+            </a:fontRef>
+          </p:style>
+          <p:txBody>
+            <a:bodyPr rtlCol="0" anchor="ctr"/>
+            <a:lstStyle/>
+            <a:p>
+              <a:pPr algn="l"/>
+              <a:r>
+                <a:rPr lang="de-DE" sz="969" b="1" dirty="0">
+                  <a:solidFill>
+                    <a:srgbClr val="000000"/>
+                  </a:solidFill>
+                  <a:latin typeface="Helvetica" panose="020B0604020202020204" pitchFamily="34" charset="0"/>
+                </a:rPr>
+                <a:t>Name: Rücken zur Wand</a:t>
+              </a:r>
+              <a:endParaRPr lang="de-DE" sz="969" dirty="0">
+                <a:solidFill>
+                  <a:srgbClr val="000000"/>
+                </a:solidFill>
+                <a:latin typeface="Helvetica" panose="020B0604020202020204" pitchFamily="34" charset="0"/>
+              </a:endParaRPr>
+            </a:p>
+            <a:p>
+              <a:pPr algn="l"/>
+              <a:r>
+                <a:rPr lang="de-DE" sz="775" dirty="0">
+                  <a:solidFill>
+                    <a:srgbClr val="000000"/>
+                  </a:solidFill>
+                  <a:latin typeface="Helvetica" panose="020B0604020202020204" pitchFamily="34" charset="0"/>
+                </a:rPr>
+                <a:t>Karte: ALPINE PEAKS</a:t>
+              </a:r>
+            </a:p>
+            <a:p>
+              <a:pPr algn="l"/>
+              <a:r>
+                <a:rPr lang="de-DE" sz="775" dirty="0">
+                  <a:solidFill>
+                    <a:srgbClr val="000000"/>
+                  </a:solidFill>
+                  <a:latin typeface="Helvetica" panose="020B0604020202020204" pitchFamily="34" charset="0"/>
+                </a:rPr>
+                <a:t>Modus: SKIRMISH</a:t>
+              </a:r>
+              <a:br>
+                <a:rPr lang="de-DE" sz="775" dirty="0">
+                  <a:solidFill>
+                    <a:srgbClr val="000000"/>
+                  </a:solidFill>
+                  <a:latin typeface="Helvetica" panose="020B0604020202020204" pitchFamily="34" charset="0"/>
+                </a:rPr>
+              </a:br>
+              <a:br>
+                <a:rPr lang="de-DE" sz="775" dirty="0">
+                  <a:solidFill>
+                    <a:srgbClr val="000000"/>
+                  </a:solidFill>
+                  <a:latin typeface="Helvetica" panose="020B0604020202020204" pitchFamily="34" charset="0"/>
+                </a:rPr>
+              </a:br>
+              <a:r>
+                <a:rPr lang="de-DE" sz="775" i="1" dirty="0">
+                  <a:solidFill>
+                    <a:srgbClr val="000000"/>
+                  </a:solidFill>
+                  <a:latin typeface="Helvetica" panose="020B0604020202020204" pitchFamily="34" charset="0"/>
+                </a:rPr>
+                <a:t>Beschreibung:</a:t>
+              </a:r>
+              <a:br>
+                <a:rPr lang="de-DE" sz="775" dirty="0">
+                  <a:solidFill>
+                    <a:srgbClr val="000000"/>
+                  </a:solidFill>
+                  <a:latin typeface="Helvetica" panose="020B0604020202020204" pitchFamily="34" charset="0"/>
+                </a:rPr>
+              </a:br>
+              <a:r>
+                <a:rPr lang="de-DE" sz="775" dirty="0">
+                  <a:solidFill>
+                    <a:srgbClr val="000000"/>
+                  </a:solidFill>
+                  <a:latin typeface="Helvetica" panose="020B0604020202020204" pitchFamily="34" charset="0"/>
+                </a:rPr>
+                <a:t>Die Angreifer wurden in ihren Vorbereitungen gestört und in das Vulkangebiet zurückgedrängt, wo sie sich erneut zum Kampf stellen müssen.</a:t>
+              </a:r>
+            </a:p>
+            <a:p>
+              <a:pPr algn="l"/>
+              <a:endParaRPr lang="de-DE" sz="775" dirty="0">
+                <a:solidFill>
+                  <a:srgbClr val="000000"/>
+                </a:solidFill>
+                <a:latin typeface="Helvetica" panose="020B0604020202020204" pitchFamily="34" charset="0"/>
+              </a:endParaRPr>
+            </a:p>
+          </p:txBody>
+        </p:sp>
+        <p:pic>
+          <p:nvPicPr>
+            <p:cNvPr id="199" name="Grafik 198">
+              <a:extLst>
+                <a:ext uri="{FF2B5EF4-FFF2-40B4-BE49-F238E27FC236}">
+                  <a16:creationId xmlns:a16="http://schemas.microsoft.com/office/drawing/2014/main" id="{BD27327F-AF5C-471D-A870-FEC5E2772D3E}"/>
+                </a:ext>
+              </a:extLst>
+            </p:cNvPr>
+            <p:cNvPicPr>
+              <a:picLocks noChangeAspect="1"/>
+            </p:cNvPicPr>
+            <p:nvPr/>
+          </p:nvPicPr>
+          <p:blipFill>
+            <a:blip r:embed="rId17" cstate="hqprint">
+              <a:extLst>
+                <a:ext uri="{28A0092B-C50C-407E-A947-70E740481C1C}">
+                  <a14:useLocalDpi xmlns:a14="http://schemas.microsoft.com/office/drawing/2010/main" val="0"/>
+                </a:ext>
+              </a:extLst>
+            </a:blip>
+            <a:srcRect/>
+            <a:stretch/>
+          </p:blipFill>
+          <p:spPr>
+            <a:xfrm>
+              <a:off x="8263659" y="954647"/>
+              <a:ext cx="1381017" cy="1381017"/>
+            </a:xfrm>
+            <a:prstGeom prst="rect">
+              <a:avLst/>
+            </a:prstGeom>
+            <a:grpFill/>
+            <a:ln>
+              <a:solidFill>
+                <a:schemeClr val="tx1"/>
+              </a:solidFill>
+            </a:ln>
+          </p:spPr>
+        </p:pic>
+      </p:grpSp>
+      <p:grpSp>
+        <p:nvGrpSpPr>
+          <p:cNvPr id="201" name="Gruppieren 200">
+            <a:extLst>
+              <a:ext uri="{FF2B5EF4-FFF2-40B4-BE49-F238E27FC236}">
+                <a16:creationId xmlns:a16="http://schemas.microsoft.com/office/drawing/2014/main" id="{A929FECB-E019-4AD8-A565-E510F317D8FA}"/>
+              </a:ext>
+            </a:extLst>
+          </p:cNvPr>
+          <p:cNvGrpSpPr/>
+          <p:nvPr/>
+        </p:nvGrpSpPr>
+        <p:grpSpPr>
+          <a:xfrm>
+            <a:off x="9178365" y="8905378"/>
+            <a:ext cx="3609566" cy="1381533"/>
+            <a:chOff x="6035110" y="954647"/>
+            <a:chExt cx="3609566" cy="1381533"/>
+          </a:xfrm>
+          <a:solidFill>
+            <a:schemeClr val="accent1">
+              <a:lumMod val="20000"/>
+              <a:lumOff val="80000"/>
+            </a:schemeClr>
+          </a:solidFill>
+        </p:grpSpPr>
+        <p:sp>
+          <p:nvSpPr>
+            <p:cNvPr id="202" name="Rechteck: eine Ecke abgeschnitten 201">
+              <a:extLst>
+                <a:ext uri="{FF2B5EF4-FFF2-40B4-BE49-F238E27FC236}">
+                  <a16:creationId xmlns:a16="http://schemas.microsoft.com/office/drawing/2014/main" id="{21E4F2B5-EC52-4615-8C11-54D4F4BAEB0C}"/>
+                </a:ext>
+              </a:extLst>
+            </p:cNvPr>
+            <p:cNvSpPr/>
+            <p:nvPr/>
+          </p:nvSpPr>
+          <p:spPr>
+            <a:xfrm>
+              <a:off x="6035110" y="955163"/>
+              <a:ext cx="2123280" cy="1381017"/>
+            </a:xfrm>
+            <a:prstGeom prst="snip1Rect">
+              <a:avLst/>
+            </a:prstGeom>
+            <a:grpFill/>
+          </p:spPr>
+          <p:style>
+            <a:lnRef idx="1">
+              <a:schemeClr val="accent4"/>
+            </a:lnRef>
+            <a:fillRef idx="2">
+              <a:schemeClr val="accent4"/>
+            </a:fillRef>
+            <a:effectRef idx="1">
+              <a:schemeClr val="accent4"/>
+            </a:effectRef>
+            <a:fontRef idx="minor">
+              <a:schemeClr val="dk1"/>
+            </a:fontRef>
+          </p:style>
+          <p:txBody>
+            <a:bodyPr rtlCol="0" anchor="ctr"/>
+            <a:lstStyle/>
+            <a:p>
+              <a:pPr algn="l"/>
+              <a:r>
+                <a:rPr lang="de-DE" sz="969" b="1" dirty="0">
+                  <a:solidFill>
+                    <a:srgbClr val="000000"/>
+                  </a:solidFill>
+                  <a:latin typeface="Helvetica" panose="020B0604020202020204" pitchFamily="34" charset="0"/>
+                </a:rPr>
+                <a:t>Name: Letztes Gefecht</a:t>
+              </a:r>
+              <a:endParaRPr lang="de-DE" sz="969" dirty="0">
+                <a:solidFill>
+                  <a:srgbClr val="000000"/>
+                </a:solidFill>
+                <a:latin typeface="Helvetica" panose="020B0604020202020204" pitchFamily="34" charset="0"/>
+              </a:endParaRPr>
+            </a:p>
+            <a:p>
+              <a:pPr algn="l"/>
+              <a:r>
+                <a:rPr lang="de-DE" sz="775" dirty="0">
+                  <a:solidFill>
+                    <a:srgbClr val="000000"/>
+                  </a:solidFill>
+                  <a:latin typeface="Helvetica" panose="020B0604020202020204" pitchFamily="34" charset="0"/>
+                </a:rPr>
+                <a:t>Karte: HPG MANIFOLD</a:t>
+              </a:r>
+            </a:p>
+            <a:p>
+              <a:pPr algn="l"/>
+              <a:r>
+                <a:rPr lang="de-DE" sz="775" dirty="0">
+                  <a:solidFill>
+                    <a:srgbClr val="000000"/>
+                  </a:solidFill>
+                  <a:latin typeface="Helvetica" panose="020B0604020202020204" pitchFamily="34" charset="0"/>
+                </a:rPr>
+                <a:t>Modus: SKIRMISH</a:t>
+              </a:r>
+              <a:br>
+                <a:rPr lang="de-DE" sz="775" dirty="0">
+                  <a:solidFill>
+                    <a:srgbClr val="000000"/>
+                  </a:solidFill>
+                  <a:latin typeface="Helvetica" panose="020B0604020202020204" pitchFamily="34" charset="0"/>
+                </a:rPr>
+              </a:br>
+              <a:br>
+                <a:rPr lang="de-DE" sz="775" dirty="0">
+                  <a:solidFill>
+                    <a:srgbClr val="000000"/>
+                  </a:solidFill>
+                  <a:latin typeface="Helvetica" panose="020B0604020202020204" pitchFamily="34" charset="0"/>
+                </a:rPr>
+              </a:br>
+              <a:r>
+                <a:rPr lang="de-DE" sz="775" i="1" dirty="0">
+                  <a:solidFill>
+                    <a:srgbClr val="000000"/>
+                  </a:solidFill>
+                  <a:latin typeface="Helvetica" panose="020B0604020202020204" pitchFamily="34" charset="0"/>
+                </a:rPr>
+                <a:t>Beschreibung:</a:t>
+              </a:r>
+              <a:br>
+                <a:rPr lang="de-DE" sz="775" dirty="0">
+                  <a:solidFill>
+                    <a:srgbClr val="000000"/>
+                  </a:solidFill>
+                  <a:latin typeface="Helvetica" panose="020B0604020202020204" pitchFamily="34" charset="0"/>
+                </a:rPr>
+              </a:br>
+              <a:r>
+                <a:rPr lang="de-DE" sz="775" dirty="0">
+                  <a:solidFill>
+                    <a:srgbClr val="000000"/>
+                  </a:solidFill>
+                  <a:latin typeface="Helvetica" panose="020B0604020202020204" pitchFamily="34" charset="0"/>
+                </a:rPr>
+                <a:t>Es gibt keinen klaren Sieger. Nach verlustreichen Kämpfen ist nun die Zeit für einen alles entscheidenden Endkampf reif.</a:t>
               </a:r>
             </a:p>
           </p:txBody>
@@ -7531,7 +7388,7 @@
             <p:nvPr/>
           </p:nvPicPr>
           <p:blipFill>
-            <a:blip r:embed="rId16" cstate="hqprint">
+            <a:blip r:embed="rId18" cstate="hqprint">
               <a:extLst>
                 <a:ext uri="{28A0092B-C50C-407E-A947-70E740481C1C}">
                   <a14:useLocalDpi xmlns:a14="http://schemas.microsoft.com/office/drawing/2010/main" val="0"/>
@@ -8080,8 +7937,8 @@
         </p:nvSpPr>
         <p:spPr>
           <a:xfrm>
-            <a:off x="1585234" y="6198066"/>
-            <a:ext cx="1060742" cy="267630"/>
+            <a:off x="1502425" y="6198066"/>
+            <a:ext cx="1230570" cy="267630"/>
           </a:xfrm>
           <a:prstGeom prst="rect">
             <a:avLst/>
@@ -8120,7 +7977,7 @@
                   <a:schemeClr val="tx1"/>
                 </a:solidFill>
               </a:rPr>
-              <a:t>IS (A) gewinnt</a:t>
+              <a:t>CLAN (A) gewinnt</a:t>
             </a:r>
           </a:p>
         </p:txBody>
@@ -8139,8 +7996,8 @@
         </p:nvSpPr>
         <p:spPr>
           <a:xfrm>
-            <a:off x="1626914" y="8357127"/>
-            <a:ext cx="977502" cy="267630"/>
+            <a:off x="1585233" y="8357127"/>
+            <a:ext cx="1093593" cy="267630"/>
           </a:xfrm>
           <a:prstGeom prst="rect">
             <a:avLst/>
@@ -8179,7 +8036,7 @@
                   <a:schemeClr val="tx1"/>
                 </a:solidFill>
               </a:rPr>
-              <a:t>IS (A) gewinnt</a:t>
+              <a:t>CLAN (A) gewinnt</a:t>
             </a:r>
           </a:p>
         </p:txBody>
@@ -8257,8 +8114,8 @@
         </p:nvSpPr>
         <p:spPr>
           <a:xfrm>
-            <a:off x="9748008" y="6001742"/>
-            <a:ext cx="986078" cy="267630"/>
+            <a:off x="9658103" y="6001742"/>
+            <a:ext cx="1128649" cy="267630"/>
           </a:xfrm>
           <a:prstGeom prst="rect">
             <a:avLst/>
@@ -8297,7 +8154,7 @@
                   <a:schemeClr val="tx1"/>
                 </a:solidFill>
               </a:rPr>
-              <a:t>IS (A) gewinnt</a:t>
+              <a:t>CLAN (A) gewinnt</a:t>
             </a:r>
           </a:p>
         </p:txBody>
@@ -8476,8 +8333,8 @@
         </p:nvSpPr>
         <p:spPr>
           <a:xfrm>
-            <a:off x="5645262" y="8380035"/>
-            <a:ext cx="955141" cy="267630"/>
+            <a:off x="5545390" y="8380035"/>
+            <a:ext cx="1144914" cy="267630"/>
           </a:xfrm>
           <a:prstGeom prst="rect">
             <a:avLst/>
@@ -8516,7 +8373,7 @@
                   <a:schemeClr val="tx1"/>
                 </a:solidFill>
               </a:rPr>
-              <a:t>IS (A) gewinnt</a:t>
+              <a:t>CLAN (A) gewinnt</a:t>
             </a:r>
           </a:p>
         </p:txBody>
@@ -8653,8 +8510,8 @@
         </p:nvSpPr>
         <p:spPr>
           <a:xfrm>
-            <a:off x="24505558" y="4047387"/>
-            <a:ext cx="1116697" cy="267630"/>
+            <a:off x="24447930" y="4047387"/>
+            <a:ext cx="1197938" cy="267630"/>
           </a:xfrm>
           <a:prstGeom prst="rect">
             <a:avLst/>
@@ -8693,7 +8550,7 @@
                   <a:schemeClr val="tx1"/>
                 </a:solidFill>
               </a:rPr>
-              <a:t>IS (A) gewinnt</a:t>
+              <a:t>CLAN (A) gewinnt</a:t>
             </a:r>
           </a:p>
         </p:txBody>
@@ -8897,7 +8754,7 @@
                 </a:solidFill>
                 <a:latin typeface="Helvetica" panose="020B0604020202020204" pitchFamily="34" charset="0"/>
               </a:rPr>
-              <a:t>IS gewinnt / Planet wurde erobert</a:t>
+              <a:t>Clan (Angreifer) gewinnt / Planet wurde erobert</a:t>
             </a:r>
             <a:endParaRPr lang="de-DE" sz="1100" dirty="0">
               <a:solidFill>
@@ -8940,7 +8797,7 @@
                 </a:solidFill>
                 <a:latin typeface="Helvetica" panose="020B0604020202020204" pitchFamily="34" charset="0"/>
               </a:rPr>
-              <a:t>Die Angreifer haben gesiegt. Der Planet steht nun unter der Kontrolle der angreifenden IS-Fraktion.</a:t>
+              <a:t>Die Angreifer haben gesiegt. Der Planet steht nun unter der Kontrolle des angreifenden Clans.</a:t>
             </a:r>
           </a:p>
         </p:txBody>
@@ -11678,7 +11535,7 @@
                   </a:solidFill>
                   <a:latin typeface="Helvetica" panose="020B0604020202020204" pitchFamily="34" charset="0"/>
                 </a:rPr>
-                <a:t>Name: Feuersturm</a:t>
+                <a:t>Name: Wende</a:t>
               </a:r>
               <a:endParaRPr lang="de-DE" sz="969" dirty="0">
                 <a:solidFill>
@@ -11696,7 +11553,7 @@
                   </a:solidFill>
                   <a:latin typeface="Helvetica" panose="020B0604020202020204" pitchFamily="34" charset="0"/>
                 </a:rPr>
-                <a:t>Karte: TERRA THERMA</a:t>
+                <a:t>Karte: FOREST COLONY</a:t>
               </a:r>
             </a:p>
             <a:p>
@@ -11750,25 +11607,7 @@
                   </a:solidFill>
                   <a:latin typeface="Helvetica" panose="020B0604020202020204" pitchFamily="34" charset="0"/>
                 </a:rPr>
-                <a:t>Die Angreifer erringen einen erneuten Erfolg und drängen die </a:t>
-              </a:r>
-              <a:r>
-                <a:rPr lang="de-DE" sz="775" dirty="0" err="1">
-                  <a:solidFill>
-                    <a:srgbClr val="000000"/>
-                  </a:solidFill>
-                  <a:latin typeface="Helvetica" panose="020B0604020202020204" pitchFamily="34" charset="0"/>
-                </a:rPr>
-                <a:t>Clanner</a:t>
-              </a:r>
-              <a:r>
-                <a:rPr lang="de-DE" sz="775" dirty="0">
-                  <a:solidFill>
-                    <a:srgbClr val="000000"/>
-                  </a:solidFill>
-                  <a:latin typeface="Helvetica" panose="020B0604020202020204" pitchFamily="34" charset="0"/>
-                </a:rPr>
-                <a:t> ins Vulkangebiet, wo diese sich erneut dem Kampf stellen.</a:t>
+                <a:t>Es geht vor und zurück. Keine Seite kann einen klaren Vorteil erkämpfen. Der Angreifer hat wieder die Oberhand. Es gilt nun, diese zu behalten!</a:t>
               </a:r>
             </a:p>
           </p:txBody>
@@ -11788,10 +11627,10 @@
             <p:nvPr/>
           </p:nvPicPr>
           <p:blipFill>
-            <a:blip r:embed="rId17" cstate="print">
+            <a:blip r:embed="rId19" cstate="hqprint">
               <a:extLst>
                 <a:ext uri="{28A0092B-C50C-407E-A947-70E740481C1C}">
-                  <a14:useLocalDpi xmlns:a14="http://schemas.microsoft.com/office/drawing/2010/main"/>
+                  <a14:useLocalDpi xmlns:a14="http://schemas.microsoft.com/office/drawing/2010/main" val="0"/>
                 </a:ext>
               </a:extLst>
             </a:blip>
@@ -11907,7 +11746,7 @@
                   </a:solidFill>
                   <a:latin typeface="Helvetica" panose="020B0604020202020204" pitchFamily="34" charset="0"/>
                 </a:rPr>
-                <a:t>Karte: TOURMALINE DESERT</a:t>
+                <a:t>Karte: RUBELITE OASIS</a:t>
               </a:r>
             </a:p>
             <a:p>
@@ -11961,7 +11800,7 @@
                   </a:solidFill>
                   <a:latin typeface="Helvetica" panose="020B0604020202020204" pitchFamily="34" charset="0"/>
                 </a:rPr>
-                <a:t>Keine der beiden Seiten konnte effektiv die Oberhand gewinnen und es kommt zum letzten, entscheidenden Gefecht. Hier wird sich der Kampf entscheiden.</a:t>
+                <a:t>Die Entscheidung fällt in der letzten Schlacht dieser Invasion! Bisher konnte keine Seite dominieren und es wird gekämpft bis zum bitteren Ende.</a:t>
               </a:r>
             </a:p>
           </p:txBody>
@@ -11981,7 +11820,7 @@
             <p:nvPr/>
           </p:nvPicPr>
           <p:blipFill>
-            <a:blip r:embed="rId9" cstate="hqprint">
+            <a:blip r:embed="rId20" cstate="hqprint">
               <a:extLst>
                 <a:ext uri="{28A0092B-C50C-407E-A947-70E740481C1C}">
                   <a14:useLocalDpi xmlns:a14="http://schemas.microsoft.com/office/drawing/2010/main" val="0"/>
@@ -12082,7 +11921,7 @@
                   </a:solidFill>
                   <a:latin typeface="Helvetica" panose="020B0604020202020204" pitchFamily="34" charset="0"/>
                 </a:rPr>
-                <a:t>Name: Der Weg zurück</a:t>
+                <a:t>Name: Feuersturm</a:t>
               </a:r>
               <a:endParaRPr lang="de-DE" sz="969" dirty="0">
                 <a:solidFill>
@@ -12100,7 +11939,7 @@
                   </a:solidFill>
                   <a:latin typeface="Helvetica" panose="020B0604020202020204" pitchFamily="34" charset="0"/>
                 </a:rPr>
-                <a:t>Karte: FOREST COLONY</a:t>
+                <a:t>Karte: CANYON NETWORK</a:t>
               </a:r>
             </a:p>
             <a:p>
@@ -12154,7 +11993,7 @@
                   </a:solidFill>
                   <a:latin typeface="Helvetica" panose="020B0604020202020204" pitchFamily="34" charset="0"/>
                 </a:rPr>
-                <a:t>Die Verteidiger haben Hoffnung geschöpft und bereiten sich darauf vor, die Invasoren zurückzuschlagen. Es kommt im Waldgebiet zur erneuten Konfrontation.</a:t>
+                <a:t>Die Verteidiger können das Blatt wenden. Die Kämpfe sind hart und unerbittlich, aber es besteht noch eine Chance. Ein weiterer Kampf steht bevor.</a:t>
               </a:r>
             </a:p>
           </p:txBody>
@@ -12174,7 +12013,7 @@
             <p:nvPr/>
           </p:nvPicPr>
           <p:blipFill>
-            <a:blip r:embed="rId18" cstate="hqprint">
+            <a:blip r:embed="rId21" cstate="hqprint">
               <a:extLst>
                 <a:ext uri="{28A0092B-C50C-407E-A947-70E740481C1C}">
                   <a14:useLocalDpi xmlns:a14="http://schemas.microsoft.com/office/drawing/2010/main" val="0"/>
@@ -12293,7 +12132,7 @@
                   </a:solidFill>
                   <a:latin typeface="Helvetica" panose="020B0604020202020204" pitchFamily="34" charset="0"/>
                 </a:rPr>
-                <a:t>Karte: ALPINE PEAKS</a:t>
+                <a:t>Karte: FROZEN CITY (NIGHT)</a:t>
               </a:r>
             </a:p>
             <a:p>
@@ -12347,17 +12186,8 @@
                   </a:solidFill>
                   <a:latin typeface="Helvetica" panose="020B0604020202020204" pitchFamily="34" charset="0"/>
                 </a:rPr>
-                <a:t>Beide Seiten haben Niederlagen aber auch Erfolge erlebt. Es muss eine Entscheidung geben. Beide Seiten sind entschlossen, als Sieger hervorzugehen.</a:t>
+                <a:t>Bis zur allerletzten Minute bleibt offen, wer den Sieg davontragen wird. Beide Seiten gehen zuversichtlich in die letzte Schlacht der Invasion.</a:t>
               </a:r>
-            </a:p>
-            <a:p>
-              <a:pPr algn="l"/>
-              <a:endParaRPr lang="de-DE" sz="775" dirty="0">
-                <a:solidFill>
-                  <a:srgbClr val="000000"/>
-                </a:solidFill>
-                <a:latin typeface="Helvetica" panose="020B0604020202020204" pitchFamily="34" charset="0"/>
-              </a:endParaRPr>
             </a:p>
           </p:txBody>
         </p:sp>
@@ -12376,7 +12206,7 @@
             <p:nvPr/>
           </p:nvPicPr>
           <p:blipFill>
-            <a:blip r:embed="rId19" cstate="hqprint">
+            <a:blip r:embed="rId22" cstate="hqprint">
               <a:extLst>
                 <a:ext uri="{28A0092B-C50C-407E-A947-70E740481C1C}">
                   <a14:useLocalDpi xmlns:a14="http://schemas.microsoft.com/office/drawing/2010/main" val="0"/>
@@ -12605,7 +12435,7 @@
                   <a:schemeClr val="tx1"/>
                 </a:solidFill>
               </a:rPr>
-              <a:t>IS (A) gewinnt</a:t>
+              <a:t>CLAN (A) gewinnt</a:t>
             </a:r>
           </a:p>
         </p:txBody>
@@ -15494,8 +15324,8 @@
         </p:nvSpPr>
         <p:spPr>
           <a:xfrm>
-            <a:off x="20313536" y="6207128"/>
-            <a:ext cx="1057298" cy="267630"/>
+            <a:off x="20243179" y="6207128"/>
+            <a:ext cx="1218275" cy="267630"/>
           </a:xfrm>
           <a:prstGeom prst="rect">
             <a:avLst/>
@@ -15534,7 +15364,7 @@
                   <a:schemeClr val="tx1"/>
                 </a:solidFill>
               </a:rPr>
-              <a:t>IS (A) gewinnt</a:t>
+              <a:t>CLAN (A) gewinnt</a:t>
             </a:r>
           </a:p>
         </p:txBody>
@@ -17675,8 +17505,8 @@
         </p:nvSpPr>
         <p:spPr>
           <a:xfrm>
-            <a:off x="20351353" y="12421887"/>
-            <a:ext cx="1019481" cy="267630"/>
+            <a:off x="20243179" y="12421887"/>
+            <a:ext cx="1218275" cy="267630"/>
           </a:xfrm>
           <a:prstGeom prst="rect">
             <a:avLst/>
@@ -17715,7 +17545,7 @@
                   <a:schemeClr val="tx1"/>
                 </a:solidFill>
               </a:rPr>
-              <a:t>IS (A) gewinnt</a:t>
+              <a:t>CLAN (A) gewinnt</a:t>
             </a:r>
           </a:p>
         </p:txBody>
@@ -18076,7 +17906,7 @@
           <p:nvPr/>
         </p:nvPicPr>
         <p:blipFill>
-          <a:blip r:embed="rId20">
+          <a:blip r:embed="rId23">
             <a:extLst>
               <a:ext uri="{28A0092B-C50C-407E-A947-70E740481C1C}">
                 <a14:useLocalDpi xmlns:a14="http://schemas.microsoft.com/office/drawing/2010/main"/>
@@ -18262,7 +18092,7 @@
           <p:nvPr/>
         </p:nvPicPr>
         <p:blipFill>
-          <a:blip r:embed="rId21">
+          <a:blip r:embed="rId24">
             <a:extLst>
               <a:ext uri="{28A0092B-C50C-407E-A947-70E740481C1C}">
                 <a14:useLocalDpi xmlns:a14="http://schemas.microsoft.com/office/drawing/2010/main"/>
@@ -18298,7 +18128,7 @@
           <p:nvPr/>
         </p:nvPicPr>
         <p:blipFill>
-          <a:blip r:embed="rId22">
+          <a:blip r:embed="rId25">
             <a:extLst>
               <a:ext uri="{28A0092B-C50C-407E-A947-70E740481C1C}">
                 <a14:useLocalDpi xmlns:a14="http://schemas.microsoft.com/office/drawing/2010/main"/>
@@ -19208,7 +19038,7 @@
                   <a:schemeClr val="tx1"/>
                 </a:solidFill>
               </a:rPr>
-              <a:t>ROT: MWO Team 2, unten (ANGREIFER) – IS</a:t>
+              <a:t>ROT: MWO Team 2, unten (ANGREIFER) – CLAN</a:t>
             </a:r>
           </a:p>
         </p:txBody>

</xml_diff>

<commit_message>
Version 7.1.23 (03.08.2022) - UPDATED: A number of fixed were made to the pdf end round report - FIXED: Countdown display - FIXED: Story relations for Clan vs Clan
</commit_message>
<xml_diff>
--- a/doc/manual/CWG_S003_var01_v1-PlanetareInvasion_CLAN_vs_CLAN.pptx
+++ b/doc/manual/CWG_S003_var01_v1-PlanetareInvasion_CLAN_vs_CLAN.pptx
@@ -243,7 +243,7 @@
           <a:p>
             <a:fld id="{FD7029C7-F9F9-43C6-8A9F-B11F033DBFC4}" type="datetimeFigureOut">
               <a:rPr lang="de-DE" smtClean="0"/>
-              <a:t>25.07.2022</a:t>
+              <a:t>03.08.2022</a:t>
             </a:fld>
             <a:endParaRPr lang="de-DE"/>
           </a:p>
@@ -413,7 +413,7 @@
           <a:p>
             <a:fld id="{FD7029C7-F9F9-43C6-8A9F-B11F033DBFC4}" type="datetimeFigureOut">
               <a:rPr lang="de-DE" smtClean="0"/>
-              <a:t>25.07.2022</a:t>
+              <a:t>03.08.2022</a:t>
             </a:fld>
             <a:endParaRPr lang="de-DE"/>
           </a:p>
@@ -593,7 +593,7 @@
           <a:p>
             <a:fld id="{FD7029C7-F9F9-43C6-8A9F-B11F033DBFC4}" type="datetimeFigureOut">
               <a:rPr lang="de-DE" smtClean="0"/>
-              <a:t>25.07.2022</a:t>
+              <a:t>03.08.2022</a:t>
             </a:fld>
             <a:endParaRPr lang="de-DE"/>
           </a:p>
@@ -763,7 +763,7 @@
           <a:p>
             <a:fld id="{FD7029C7-F9F9-43C6-8A9F-B11F033DBFC4}" type="datetimeFigureOut">
               <a:rPr lang="de-DE" smtClean="0"/>
-              <a:t>25.07.2022</a:t>
+              <a:t>03.08.2022</a:t>
             </a:fld>
             <a:endParaRPr lang="de-DE"/>
           </a:p>
@@ -1009,7 +1009,7 @@
           <a:p>
             <a:fld id="{FD7029C7-F9F9-43C6-8A9F-B11F033DBFC4}" type="datetimeFigureOut">
               <a:rPr lang="de-DE" smtClean="0"/>
-              <a:t>25.07.2022</a:t>
+              <a:t>03.08.2022</a:t>
             </a:fld>
             <a:endParaRPr lang="de-DE"/>
           </a:p>
@@ -1241,7 +1241,7 @@
           <a:p>
             <a:fld id="{FD7029C7-F9F9-43C6-8A9F-B11F033DBFC4}" type="datetimeFigureOut">
               <a:rPr lang="de-DE" smtClean="0"/>
-              <a:t>25.07.2022</a:t>
+              <a:t>03.08.2022</a:t>
             </a:fld>
             <a:endParaRPr lang="de-DE"/>
           </a:p>
@@ -1608,7 +1608,7 @@
           <a:p>
             <a:fld id="{FD7029C7-F9F9-43C6-8A9F-B11F033DBFC4}" type="datetimeFigureOut">
               <a:rPr lang="de-DE" smtClean="0"/>
-              <a:t>25.07.2022</a:t>
+              <a:t>03.08.2022</a:t>
             </a:fld>
             <a:endParaRPr lang="de-DE"/>
           </a:p>
@@ -1726,7 +1726,7 @@
           <a:p>
             <a:fld id="{FD7029C7-F9F9-43C6-8A9F-B11F033DBFC4}" type="datetimeFigureOut">
               <a:rPr lang="de-DE" smtClean="0"/>
-              <a:t>25.07.2022</a:t>
+              <a:t>03.08.2022</a:t>
             </a:fld>
             <a:endParaRPr lang="de-DE"/>
           </a:p>
@@ -1821,7 +1821,7 @@
           <a:p>
             <a:fld id="{FD7029C7-F9F9-43C6-8A9F-B11F033DBFC4}" type="datetimeFigureOut">
               <a:rPr lang="de-DE" smtClean="0"/>
-              <a:t>25.07.2022</a:t>
+              <a:t>03.08.2022</a:t>
             </a:fld>
             <a:endParaRPr lang="de-DE"/>
           </a:p>
@@ -2098,7 +2098,7 @@
           <a:p>
             <a:fld id="{FD7029C7-F9F9-43C6-8A9F-B11F033DBFC4}" type="datetimeFigureOut">
               <a:rPr lang="de-DE" smtClean="0"/>
-              <a:t>25.07.2022</a:t>
+              <a:t>03.08.2022</a:t>
             </a:fld>
             <a:endParaRPr lang="de-DE"/>
           </a:p>
@@ -2355,7 +2355,7 @@
           <a:p>
             <a:fld id="{FD7029C7-F9F9-43C6-8A9F-B11F033DBFC4}" type="datetimeFigureOut">
               <a:rPr lang="de-DE" smtClean="0"/>
-              <a:t>25.07.2022</a:t>
+              <a:t>03.08.2022</a:t>
             </a:fld>
             <a:endParaRPr lang="de-DE"/>
           </a:p>
@@ -2568,7 +2568,7 @@
           <a:p>
             <a:fld id="{FD7029C7-F9F9-43C6-8A9F-B11F033DBFC4}" type="datetimeFigureOut">
               <a:rPr lang="de-DE" smtClean="0"/>
-              <a:t>25.07.2022</a:t>
+              <a:t>03.08.2022</a:t>
             </a:fld>
             <a:endParaRPr lang="de-DE"/>
           </a:p>
@@ -3770,16 +3770,7 @@
                   </a:solidFill>
                   <a:latin typeface="Helvetica" panose="020B0604020202020204" pitchFamily="34" charset="0"/>
                 </a:rPr>
-                <a:t>Name: </a:t>
-              </a:r>
-              <a:r>
-                <a:rPr lang="de-DE" sz="969" b="1" dirty="0" err="1">
-                  <a:solidFill>
-                    <a:srgbClr val="000000"/>
-                  </a:solidFill>
-                  <a:latin typeface="Helvetica" panose="020B0604020202020204" pitchFamily="34" charset="0"/>
-                </a:rPr>
-                <a:t>SavCon</a:t>
+                <a:t>Name: SafCon</a:t>
               </a:r>
               <a:endParaRPr lang="de-DE" sz="969" dirty="0">
                 <a:solidFill>
@@ -6433,23 +6424,8 @@
                   </a:solidFill>
                   <a:latin typeface="Helvetica" panose="020B0604020202020204" pitchFamily="34" charset="0"/>
                 </a:rPr>
-                <a:t>Die Entscheidung steht auf Messers Schneide. Im letzten Kampf der Invasion treffen beide Seiten aufeinander, um endgültig einen Sieger </a:t>
+                <a:t>Die Entscheidung steht auf Messers Schneide. Im letzten Kampf der Invasion treffen beide Seiten aufeinander, um endgültig einen Sieger zu bestimmen.</a:t>
               </a:r>
-              <a:r>
-                <a:rPr lang="de-DE" sz="775">
-                  <a:solidFill>
-                    <a:srgbClr val="000000"/>
-                  </a:solidFill>
-                  <a:latin typeface="Helvetica" panose="020B0604020202020204" pitchFamily="34" charset="0"/>
-                </a:rPr>
-                <a:t>zu bestimmen.</a:t>
-              </a:r>
-              <a:endParaRPr lang="de-DE" sz="775" dirty="0">
-                <a:solidFill>
-                  <a:srgbClr val="000000"/>
-                </a:solidFill>
-                <a:latin typeface="Helvetica" panose="020B0604020202020204" pitchFamily="34" charset="0"/>
-              </a:endParaRPr>
             </a:p>
           </p:txBody>
         </p:sp>

</xml_diff>